<commit_message>
Corregido nombre del framework Sinata -> Sinatra
</commit_message>
<xml_diff>
--- a/PresentacionWusick.pptx
+++ b/PresentacionWusick.pptx
@@ -335,7 +335,7 @@
           <a:p>
             <a:fld id="{EB2C0438-4ADC-4637-B688-53620CBCE1C9}" type="datetimeFigureOut">
               <a:rPr lang="es-ES" smtClean="0"/>
-              <a:t>16/06/2014</a:t>
+              <a:t>17/10/2016</a:t>
             </a:fld>
             <a:endParaRPr lang="es-ES"/>
           </a:p>
@@ -512,7 +512,7 @@
           <a:p>
             <a:fld id="{EB2C0438-4ADC-4637-B688-53620CBCE1C9}" type="datetimeFigureOut">
               <a:rPr lang="es-ES" smtClean="0"/>
-              <a:t>16/06/2014</a:t>
+              <a:t>17/10/2016</a:t>
             </a:fld>
             <a:endParaRPr lang="es-ES"/>
           </a:p>
@@ -710,7 +710,7 @@
           <a:p>
             <a:fld id="{EB2C0438-4ADC-4637-B688-53620CBCE1C9}" type="datetimeFigureOut">
               <a:rPr lang="es-ES" smtClean="0"/>
-              <a:t>16/06/2014</a:t>
+              <a:t>17/10/2016</a:t>
             </a:fld>
             <a:endParaRPr lang="es-ES"/>
           </a:p>
@@ -864,7 +864,7 @@
           <a:p>
             <a:fld id="{EB2C0438-4ADC-4637-B688-53620CBCE1C9}" type="datetimeFigureOut">
               <a:rPr lang="es-ES" smtClean="0"/>
-              <a:t>16/06/2014</a:t>
+              <a:t>17/10/2016</a:t>
             </a:fld>
             <a:endParaRPr lang="es-ES"/>
           </a:p>
@@ -1139,7 +1139,7 @@
           <a:p>
             <a:fld id="{EB2C0438-4ADC-4637-B688-53620CBCE1C9}" type="datetimeFigureOut">
               <a:rPr lang="es-ES" smtClean="0"/>
-              <a:t>16/06/2014</a:t>
+              <a:t>17/10/2016</a:t>
             </a:fld>
             <a:endParaRPr lang="es-ES"/>
           </a:p>
@@ -1438,7 +1438,7 @@
           <a:p>
             <a:fld id="{EB2C0438-4ADC-4637-B688-53620CBCE1C9}" type="datetimeFigureOut">
               <a:rPr lang="es-ES" smtClean="0"/>
-              <a:t>16/06/2014</a:t>
+              <a:t>17/10/2016</a:t>
             </a:fld>
             <a:endParaRPr lang="es-ES"/>
           </a:p>
@@ -1880,7 +1880,7 @@
           <a:p>
             <a:fld id="{EB2C0438-4ADC-4637-B688-53620CBCE1C9}" type="datetimeFigureOut">
               <a:rPr lang="es-ES" smtClean="0"/>
-              <a:t>16/06/2014</a:t>
+              <a:t>17/10/2016</a:t>
             </a:fld>
             <a:endParaRPr lang="es-ES"/>
           </a:p>
@@ -1987,7 +1987,7 @@
           <a:p>
             <a:fld id="{EB2C0438-4ADC-4637-B688-53620CBCE1C9}" type="datetimeFigureOut">
               <a:rPr lang="es-ES" smtClean="0"/>
-              <a:t>16/06/2014</a:t>
+              <a:t>17/10/2016</a:t>
             </a:fld>
             <a:endParaRPr lang="es-ES"/>
           </a:p>
@@ -2107,7 +2107,7 @@
           <a:p>
             <a:fld id="{EB2C0438-4ADC-4637-B688-53620CBCE1C9}" type="datetimeFigureOut">
               <a:rPr lang="es-ES" smtClean="0"/>
-              <a:t>16/06/2014</a:t>
+              <a:t>17/10/2016</a:t>
             </a:fld>
             <a:endParaRPr lang="es-ES"/>
           </a:p>
@@ -2392,7 +2392,7 @@
           <a:p>
             <a:fld id="{EB2C0438-4ADC-4637-B688-53620CBCE1C9}" type="datetimeFigureOut">
               <a:rPr lang="es-ES" smtClean="0"/>
-              <a:t>16/06/2014</a:t>
+              <a:t>17/10/2016</a:t>
             </a:fld>
             <a:endParaRPr lang="es-ES"/>
           </a:p>
@@ -2663,7 +2663,7 @@
           <a:p>
             <a:fld id="{EB2C0438-4ADC-4637-B688-53620CBCE1C9}" type="datetimeFigureOut">
               <a:rPr lang="es-ES" smtClean="0"/>
-              <a:t>16/06/2014</a:t>
+              <a:t>17/10/2016</a:t>
             </a:fld>
             <a:endParaRPr lang="es-ES"/>
           </a:p>
@@ -2886,7 +2886,7 @@
           <a:p>
             <a:fld id="{EB2C0438-4ADC-4637-B688-53620CBCE1C9}" type="datetimeFigureOut">
               <a:rPr lang="es-ES" smtClean="0"/>
-              <a:t>16/06/2014</a:t>
+              <a:t>17/10/2016</a:t>
             </a:fld>
             <a:endParaRPr lang="es-ES"/>
           </a:p>
@@ -5436,12 +5436,12 @@
               <a:t>, inspirado en </a:t>
             </a:r>
             <a:r>
-              <a:rPr lang="es-ES" i="0" dirty="0" err="1" smtClean="0"/>
-              <a:t>Sinata</a:t>
-            </a:r>
-            <a:r>
               <a:rPr lang="es-ES" i="0" dirty="0" smtClean="0"/>
-              <a:t> (</a:t>
+              <a:t>Sinatra </a:t>
+            </a:r>
+            <a:r>
+              <a:rPr lang="es-ES" i="0" dirty="0" smtClean="0"/>
+              <a:t>(</a:t>
             </a:r>
             <a:r>
               <a:rPr lang="es-ES" i="0" dirty="0" err="1" smtClean="0"/>
@@ -5666,13 +5666,8 @@
             </a:r>
             <a:r>
               <a:rPr lang="es-ES" i="0" dirty="0" smtClean="0"/>
-              <a:t>, y que utilizaremos el log en modo desarrollo</a:t>
-            </a:r>
-            <a:r>
-              <a:rPr lang="es-ES" i="0" dirty="0" smtClean="0"/>
-              <a:t>. De esta manera, podemos definir diferentes entornos donde operará nuestra aplicación, producción, desarrollo, o como queramos llamarlos, con diferentes configuraciones para cada caso, a través de las variables de entorno del sistema operativo donde se esté ejecutando.</a:t>
-            </a:r>
-            <a:endParaRPr lang="es-ES" i="0" dirty="0" smtClean="0"/>
+              <a:t>, y que utilizaremos el log en modo desarrollo. De esta manera, podemos definir diferentes entornos donde operará nuestra aplicación, producción, desarrollo, o como queramos llamarlos, con diferentes configuraciones para cada caso, a través de las variables de entorno del sistema operativo donde se esté ejecutando.</a:t>
+            </a:r>
           </a:p>
           <a:p>
             <a:endParaRPr lang="es" u="sng" dirty="0" smtClean="0"/>
@@ -6140,15 +6135,7 @@
             </a:r>
             <a:r>
               <a:rPr lang="es" i="0" dirty="0" smtClean="0"/>
-              <a:t>, le indicamos la ruta, a  la que se le pueden incluir parámetros (id en los tres primeros casos), seguidos del método de llamada (POST,GET…) y la función a la que llamamos, en este caso, todas las funciones están en un </a:t>
-            </a:r>
-            <a:r>
-              <a:rPr lang="es" i="0" dirty="0" smtClean="0"/>
-              <a:t>archivo llamado user.js, </a:t>
-            </a:r>
-            <a:r>
-              <a:rPr lang="es" i="0" dirty="0" smtClean="0"/>
-              <a:t>ya que son funciones relacionadas con los usuarios</a:t>
+              <a:t>, le indicamos la ruta, a  la que se le pueden incluir parámetros (id en los tres primeros casos), seguidos del método de llamada (POST,GET…) y la función a la que llamamos, en este caso, todas las funciones están en un archivo llamado user.js, ya que son funciones relacionadas con los usuarios</a:t>
             </a:r>
           </a:p>
           <a:p>
@@ -6714,15 +6701,7 @@
             </a:r>
             <a:r>
               <a:rPr lang="es" i="0" dirty="0" smtClean="0"/>
-              <a:t>, por lo tanto sería ideal para el caso que nos ocupa, la creación de una red social,  </a:t>
-            </a:r>
-            <a:r>
-              <a:rPr lang="es" i="0" dirty="0" smtClean="0"/>
-              <a:t>¿y </a:t>
-            </a:r>
-            <a:r>
-              <a:rPr lang="es" i="0" dirty="0" smtClean="0"/>
-              <a:t>como lo hace? </a:t>
+              <a:t>, por lo tanto sería ideal para el caso que nos ocupa, la creación de una red social,  ¿y como lo hace? </a:t>
             </a:r>
           </a:p>
           <a:p>
@@ -6785,11 +6764,7 @@
             </a:r>
             <a:r>
               <a:rPr lang="es-ES" i="0" dirty="0" smtClean="0"/>
-              <a:t>. Esto también nos ahorraría costes </a:t>
-            </a:r>
-            <a:r>
-              <a:rPr lang="es-ES" i="0" dirty="0" smtClean="0"/>
-              <a:t>de </a:t>
+              <a:t>. Esto también nos ahorraría costes de </a:t>
             </a:r>
             <a:r>
               <a:rPr lang="es-ES" b="1" i="0" dirty="0" smtClean="0"/>
@@ -9892,15 +9867,7 @@
             </a:r>
             <a:r>
               <a:rPr lang="es-ES" sz="2000" i="0" dirty="0" smtClean="0"/>
-              <a:t> </a:t>
-            </a:r>
-            <a:r>
-              <a:rPr lang="es-ES" sz="2000" i="0" dirty="0" smtClean="0"/>
-              <a:t>de nuestra </a:t>
-            </a:r>
-            <a:r>
-              <a:rPr lang="es-ES" sz="2000" i="0" dirty="0" smtClean="0"/>
-              <a:t>aplicación</a:t>
+              <a:t> de nuestra aplicación</a:t>
             </a:r>
             <a:endParaRPr lang="es-ES" sz="2000" i="0" dirty="0"/>
           </a:p>
@@ -10340,15 +10307,7 @@
             </a:r>
             <a:r>
               <a:rPr lang="es-ES" dirty="0" smtClean="0"/>
-              <a:t>/, ésta tiene que </a:t>
-            </a:r>
-            <a:r>
-              <a:rPr lang="es-ES" dirty="0" smtClean="0"/>
-              <a:t>estar </a:t>
-            </a:r>
-            <a:r>
-              <a:rPr lang="es-ES" dirty="0" smtClean="0"/>
-              <a:t>declarada correctamente en las rutas de la aplicación (routes.js) y llamar a una función de </a:t>
+              <a:t>/, ésta tiene que estar declarada correctamente en las rutas de la aplicación (routes.js) y llamar a una función de </a:t>
             </a:r>
             <a:r>
               <a:rPr lang="es-ES" dirty="0" err="1" smtClean="0"/>
@@ -11307,19 +11266,7 @@
             </a:r>
             <a:r>
               <a:rPr lang="es-ES" sz="1900" i="0" dirty="0" smtClean="0"/>
-              <a:t> de CSS creado por Twitter, que nos permite maquetar páginas web adaptativas de manera fácil y rápida a través de sus clases predefinidas. </a:t>
-            </a:r>
-            <a:r>
-              <a:rPr lang="es-ES" sz="1900" i="0" dirty="0" smtClean="0"/>
-              <a:t>Cuenta </a:t>
-            </a:r>
-            <a:r>
-              <a:rPr lang="es-ES" sz="1900" i="0" dirty="0" smtClean="0"/>
-              <a:t>con </a:t>
-            </a:r>
-            <a:r>
-              <a:rPr lang="es-ES" sz="1900" i="0" dirty="0" smtClean="0"/>
-              <a:t>su propia API con la que poder guiarnos a la hora de diseñar. Vemos un pequeño ejemplo en nuestra aplicación</a:t>
+              <a:t> de CSS creado por Twitter, que nos permite maquetar páginas web adaptativas de manera fácil y rápida a través de sus clases predefinidas. Cuenta con su propia API con la que poder guiarnos a la hora de diseñar. Vemos un pequeño ejemplo en nuestra aplicación</a:t>
             </a:r>
             <a:endParaRPr lang="es-ES" i="0" dirty="0">
               <a:latin typeface="Lato Light" pitchFamily="34" charset="0"/>
@@ -11701,11 +11648,7 @@
             </a:r>
             <a:r>
               <a:rPr lang="es-ES" sz="2000" i="0" dirty="0" smtClean="0"/>
-              <a:t> </a:t>
-            </a:r>
-            <a:r>
-              <a:rPr lang="es-ES" sz="2000" i="0" dirty="0" smtClean="0"/>
-              <a:t>que nos ayuda a desarrollar cómodamente un mismo proyecto a diferentes personas sin tener que estar en el mismo lugar o conectados a la misma red. </a:t>
+              <a:t> que nos ayuda a desarrollar cómodamente un mismo proyecto a diferentes personas sin tener que estar en el mismo lugar o conectados a la misma red. </a:t>
             </a:r>
           </a:p>
           <a:p>
@@ -18339,11 +18282,7 @@
             </a:r>
             <a:r>
               <a:rPr lang="es-ES" dirty="0" smtClean="0"/>
-              <a:t>Automatiza tareas repetitivas, como son la </a:t>
-            </a:r>
-            <a:r>
-              <a:rPr lang="es-ES" dirty="0" smtClean="0"/>
-              <a:t>compilación</a:t>
+              <a:t>Automatiza tareas repetitivas, como son la compilación</a:t>
             </a:r>
             <a:r>
               <a:rPr lang="es-ES" dirty="0"/>
@@ -18408,7 +18347,6 @@
               <a:rPr lang="es-ES" dirty="0"/>
               <a:t>js.com/</a:t>
             </a:r>
-            <a:endParaRPr lang="es-ES" dirty="0"/>
           </a:p>
         </p:txBody>
       </p:sp>
@@ -18445,11 +18383,7 @@
             </a:r>
             <a:r>
               <a:rPr lang="es-ES" dirty="0" smtClean="0"/>
-              <a:t>Creado por Twitter, es </a:t>
-            </a:r>
-            <a:r>
-              <a:rPr lang="es-ES" dirty="0" smtClean="0"/>
-              <a:t>un </a:t>
+              <a:t>Creado por Twitter, es un </a:t>
             </a:r>
             <a:r>
               <a:rPr lang="es-ES" dirty="0"/>
@@ -18490,7 +18424,6 @@
               <a:rPr lang="es-ES" dirty="0"/>
               <a:t>.io/</a:t>
             </a:r>
-            <a:endParaRPr lang="es-ES" dirty="0"/>
           </a:p>
         </p:txBody>
       </p:sp>
@@ -19643,15 +19576,7 @@
             </a:r>
             <a:r>
               <a:rPr lang="es-ES" sz="2000" dirty="0" smtClean="0"/>
-              <a:t>, como </a:t>
-            </a:r>
-            <a:r>
-              <a:rPr lang="es-ES" sz="2000" dirty="0" smtClean="0"/>
-              <a:t>podemos medio adivinar, se </a:t>
-            </a:r>
-            <a:r>
-              <a:rPr lang="es-ES" sz="2000" dirty="0" smtClean="0"/>
-              <a:t>llama </a:t>
+              <a:t>, como podemos medio adivinar, se llama </a:t>
             </a:r>
             <a:r>
               <a:rPr lang="es-ES" sz="2000" dirty="0"/>

</xml_diff>